<commit_message>
Update TL3 for CS3210
</commit_message>
<xml_diff>
--- a/CS3210/CS3210-TL3 (Lab 2).pptx
+++ b/CS3210/CS3210-TL3 (Lab 2).pptx
@@ -21,7 +21,7 @@
     <p:sldId id="264" r:id="rId12"/>
     <p:sldId id="367" r:id="rId13"/>
     <p:sldId id="265" r:id="rId14"/>
-    <p:sldId id="365" r:id="rId15"/>
+    <p:sldId id="370" r:id="rId15"/>
     <p:sldId id="266" r:id="rId16"/>
     <p:sldId id="267" r:id="rId17"/>
     <p:sldId id="268" r:id="rId18"/>
@@ -645,7 +645,7 @@
   <p:cSld>
     <p:spTree>
       <p:nvGrpSpPr>
-        <p:cNvPr id="1" name="Shape 148"/>
+        <p:cNvPr id="1" name="Shape 142"/>
         <p:cNvGrpSpPr/>
         <p:nvPr/>
       </p:nvGrpSpPr>
@@ -659,7 +659,7 @@
       </p:grpSpPr>
       <p:sp>
         <p:nvSpPr>
-          <p:cNvPr id="149" name="Google Shape;149;g27d7db3d6e8_0_0:notes"/>
+          <p:cNvPr id="143" name="Google Shape;143;g243b168c69a_0_45:notes"/>
           <p:cNvSpPr>
             <a:spLocks noGrp="1" noRot="1" noChangeAspect="1"/>
           </p:cNvSpPr>
@@ -700,7 +700,7 @@
       </p:sp>
       <p:sp>
         <p:nvSpPr>
-          <p:cNvPr id="150" name="Google Shape;150;g27d7db3d6e8_0_0:notes"/>
+          <p:cNvPr id="144" name="Google Shape;144;g243b168c69a_0_45:notes"/>
           <p:cNvSpPr txBox="1">
             <a:spLocks noGrp="1"/>
           </p:cNvSpPr>
@@ -749,7 +749,7 @@
   <p:cSld>
     <p:spTree>
       <p:nvGrpSpPr>
-        <p:cNvPr id="1" name="Shape 155"/>
+        <p:cNvPr id="1" name="Shape 148"/>
         <p:cNvGrpSpPr/>
         <p:nvPr/>
       </p:nvGrpSpPr>
@@ -763,7 +763,7 @@
       </p:grpSpPr>
       <p:sp>
         <p:nvSpPr>
-          <p:cNvPr id="156" name="Google Shape;156;g243b168c69a_0_51:notes"/>
+          <p:cNvPr id="149" name="Google Shape;149;g27d7db3d6e8_0_0:notes"/>
           <p:cNvSpPr>
             <a:spLocks noGrp="1" noRot="1" noChangeAspect="1"/>
           </p:cNvSpPr>
@@ -804,7 +804,7 @@
       </p:sp>
       <p:sp>
         <p:nvSpPr>
-          <p:cNvPr id="157" name="Google Shape;157;g243b168c69a_0_51:notes"/>
+          <p:cNvPr id="150" name="Google Shape;150;g27d7db3d6e8_0_0:notes"/>
           <p:cNvSpPr txBox="1">
             <a:spLocks noGrp="1"/>
           </p:cNvSpPr>
@@ -853,7 +853,7 @@
   <p:cSld>
     <p:spTree>
       <p:nvGrpSpPr>
-        <p:cNvPr id="1" name="Shape 166"/>
+        <p:cNvPr id="1" name="Shape 155"/>
         <p:cNvGrpSpPr/>
         <p:nvPr/>
       </p:nvGrpSpPr>
@@ -867,7 +867,7 @@
       </p:grpSpPr>
       <p:sp>
         <p:nvSpPr>
-          <p:cNvPr id="167" name="Google Shape;167;g27d7db3d6e8_0_16:notes"/>
+          <p:cNvPr id="156" name="Google Shape;156;g243b168c69a_0_51:notes"/>
           <p:cNvSpPr>
             <a:spLocks noGrp="1" noRot="1" noChangeAspect="1"/>
           </p:cNvSpPr>
@@ -908,7 +908,7 @@
       </p:sp>
       <p:sp>
         <p:nvSpPr>
-          <p:cNvPr id="168" name="Google Shape;168;g27d7db3d6e8_0_16:notes"/>
+          <p:cNvPr id="157" name="Google Shape;157;g243b168c69a_0_51:notes"/>
           <p:cNvSpPr txBox="1">
             <a:spLocks noGrp="1"/>
           </p:cNvSpPr>
@@ -940,10 +940,6 @@
               </a:spcAft>
               <a:buNone/>
             </a:pPr>
-            <a:r>
-              <a:rPr lang="en"/>
-              <a:t>Works if OMP_NESTED environment flag is enabled, but we will not enable the flag when we test code. Use `collapse(2)` instead.</a:t>
-            </a:r>
             <a:endParaRPr/>
           </a:p>
         </p:txBody>
@@ -957,11 +953,11 @@
 </file>
 
 <file path=ppt/notesSlides/notesSlide13.xml><?xml version="1.0" encoding="utf-8"?>
-<p:notes xmlns:a="http://schemas.openxmlformats.org/drawingml/2006/main" xmlns:r="http://schemas.openxmlformats.org/officeDocument/2006/relationships" xmlns:p="http://schemas.openxmlformats.org/presentationml/2006/main">
+<p:notes xmlns:a="http://schemas.openxmlformats.org/drawingml/2006/main" xmlns:r="http://schemas.openxmlformats.org/officeDocument/2006/relationships" xmlns:p="http://schemas.openxmlformats.org/presentationml/2006/main" showMasterSp="0" showMasterPhAnim="0">
   <p:cSld>
     <p:spTree>
       <p:nvGrpSpPr>
-        <p:cNvPr id="1" name=""/>
+        <p:cNvPr id="1" name="Shape 166"/>
         <p:cNvGrpSpPr/>
         <p:nvPr/>
       </p:nvGrpSpPr>
@@ -975,92 +971,7 @@
       </p:grpSpPr>
       <p:sp>
         <p:nvSpPr>
-          <p:cNvPr id="2" name="Slide Image Placeholder 1"/>
-          <p:cNvSpPr>
-            <a:spLocks noGrp="1" noRot="1" noChangeAspect="1"/>
-          </p:cNvSpPr>
-          <p:nvPr>
-            <p:ph type="sldImg"/>
-          </p:nvPr>
-        </p:nvSpPr>
-        <p:spPr/>
-      </p:sp>
-      <p:sp>
-        <p:nvSpPr>
-          <p:cNvPr id="3" name="Notes Placeholder 2"/>
-          <p:cNvSpPr>
-            <a:spLocks noGrp="1"/>
-          </p:cNvSpPr>
-          <p:nvPr>
-            <p:ph type="body" idx="1"/>
-          </p:nvPr>
-        </p:nvSpPr>
-        <p:spPr/>
-        <p:txBody>
-          <a:bodyPr/>
-          <a:lstStyle/>
-          <a:p>
-            <a:endParaRPr lang="en-SG"/>
-          </a:p>
-        </p:txBody>
-      </p:sp>
-      <p:sp>
-        <p:nvSpPr>
-          <p:cNvPr id="4" name="Slide Number Placeholder 3"/>
-          <p:cNvSpPr>
-            <a:spLocks noGrp="1"/>
-          </p:cNvSpPr>
-          <p:nvPr>
-            <p:ph type="sldNum" sz="quarter" idx="5"/>
-          </p:nvPr>
-        </p:nvSpPr>
-        <p:spPr/>
-        <p:txBody>
-          <a:bodyPr/>
-          <a:lstStyle/>
-          <a:p>
-            <a:fld id="{D17C5EEA-D671-4453-97C7-AF6A67BC87D3}" type="slidenum">
-              <a:rPr lang="en-US" smtClean="0"/>
-              <a:pPr/>
-              <a:t>20</a:t>
-            </a:fld>
-            <a:endParaRPr lang="en-US"/>
-          </a:p>
-        </p:txBody>
-      </p:sp>
-    </p:spTree>
-    <p:extLst>
-      <p:ext uri="{BB962C8B-B14F-4D97-AF65-F5344CB8AC3E}">
-        <p14:creationId xmlns:p14="http://schemas.microsoft.com/office/powerpoint/2010/main" val="2682755544"/>
-      </p:ext>
-    </p:extLst>
-  </p:cSld>
-  <p:clrMapOvr>
-    <a:masterClrMapping/>
-  </p:clrMapOvr>
-</p:notes>
-</file>
-
-<file path=ppt/notesSlides/notesSlide14.xml><?xml version="1.0" encoding="utf-8"?>
-<p:notes xmlns:a="http://schemas.openxmlformats.org/drawingml/2006/main" xmlns:r="http://schemas.openxmlformats.org/officeDocument/2006/relationships" xmlns:p="http://schemas.openxmlformats.org/presentationml/2006/main" showMasterSp="0" showMasterPhAnim="0">
-  <p:cSld>
-    <p:spTree>
-      <p:nvGrpSpPr>
-        <p:cNvPr id="1" name="Shape 179"/>
-        <p:cNvGrpSpPr/>
-        <p:nvPr/>
-      </p:nvGrpSpPr>
-      <p:grpSpPr>
-        <a:xfrm>
-          <a:off x="0" y="0"/>
-          <a:ext cx="0" cy="0"/>
-          <a:chOff x="0" y="0"/>
-          <a:chExt cx="0" cy="0"/>
-        </a:xfrm>
-      </p:grpSpPr>
-      <p:sp>
-        <p:nvSpPr>
-          <p:cNvPr id="180" name="Google Shape;180;g243b168c69a_0_78:notes"/>
+          <p:cNvPr id="167" name="Google Shape;167;g27d7db3d6e8_0_16:notes"/>
           <p:cNvSpPr>
             <a:spLocks noGrp="1" noRot="1" noChangeAspect="1"/>
           </p:cNvSpPr>
@@ -1101,7 +1012,7 @@
       </p:sp>
       <p:sp>
         <p:nvSpPr>
-          <p:cNvPr id="181" name="Google Shape;181;g243b168c69a_0_78:notes"/>
+          <p:cNvPr id="168" name="Google Shape;168;g27d7db3d6e8_0_16:notes"/>
           <p:cNvSpPr txBox="1">
             <a:spLocks noGrp="1"/>
           </p:cNvSpPr>
@@ -1133,11 +1044,100 @@
               </a:spcAft>
               <a:buNone/>
             </a:pPr>
+            <a:r>
+              <a:rPr lang="en"/>
+              <a:t>Works if OMP_NESTED environment flag is enabled, but we will not enable the flag when we test code. Use `collapse(2)` instead.</a:t>
+            </a:r>
             <a:endParaRPr/>
           </a:p>
         </p:txBody>
       </p:sp>
     </p:spTree>
+  </p:cSld>
+  <p:clrMapOvr>
+    <a:masterClrMapping/>
+  </p:clrMapOvr>
+</p:notes>
+</file>
+
+<file path=ppt/notesSlides/notesSlide14.xml><?xml version="1.0" encoding="utf-8"?>
+<p:notes xmlns:a="http://schemas.openxmlformats.org/drawingml/2006/main" xmlns:r="http://schemas.openxmlformats.org/officeDocument/2006/relationships" xmlns:p="http://schemas.openxmlformats.org/presentationml/2006/main">
+  <p:cSld>
+    <p:spTree>
+      <p:nvGrpSpPr>
+        <p:cNvPr id="1" name=""/>
+        <p:cNvGrpSpPr/>
+        <p:nvPr/>
+      </p:nvGrpSpPr>
+      <p:grpSpPr>
+        <a:xfrm>
+          <a:off x="0" y="0"/>
+          <a:ext cx="0" cy="0"/>
+          <a:chOff x="0" y="0"/>
+          <a:chExt cx="0" cy="0"/>
+        </a:xfrm>
+      </p:grpSpPr>
+      <p:sp>
+        <p:nvSpPr>
+          <p:cNvPr id="2" name="Slide Image Placeholder 1"/>
+          <p:cNvSpPr>
+            <a:spLocks noGrp="1" noRot="1" noChangeAspect="1"/>
+          </p:cNvSpPr>
+          <p:nvPr>
+            <p:ph type="sldImg"/>
+          </p:nvPr>
+        </p:nvSpPr>
+        <p:spPr/>
+      </p:sp>
+      <p:sp>
+        <p:nvSpPr>
+          <p:cNvPr id="3" name="Notes Placeholder 2"/>
+          <p:cNvSpPr>
+            <a:spLocks noGrp="1"/>
+          </p:cNvSpPr>
+          <p:nvPr>
+            <p:ph type="body" idx="1"/>
+          </p:nvPr>
+        </p:nvSpPr>
+        <p:spPr/>
+        <p:txBody>
+          <a:bodyPr/>
+          <a:lstStyle/>
+          <a:p>
+            <a:endParaRPr lang="en-SG"/>
+          </a:p>
+        </p:txBody>
+      </p:sp>
+      <p:sp>
+        <p:nvSpPr>
+          <p:cNvPr id="4" name="Slide Number Placeholder 3"/>
+          <p:cNvSpPr>
+            <a:spLocks noGrp="1"/>
+          </p:cNvSpPr>
+          <p:nvPr>
+            <p:ph type="sldNum" sz="quarter" idx="5"/>
+          </p:nvPr>
+        </p:nvSpPr>
+        <p:spPr/>
+        <p:txBody>
+          <a:bodyPr/>
+          <a:lstStyle/>
+          <a:p>
+            <a:fld id="{D17C5EEA-D671-4453-97C7-AF6A67BC87D3}" type="slidenum">
+              <a:rPr lang="en-US" smtClean="0"/>
+              <a:pPr/>
+              <a:t>20</a:t>
+            </a:fld>
+            <a:endParaRPr lang="en-US"/>
+          </a:p>
+        </p:txBody>
+      </p:sp>
+    </p:spTree>
+    <p:extLst>
+      <p:ext uri="{BB962C8B-B14F-4D97-AF65-F5344CB8AC3E}">
+        <p14:creationId xmlns:p14="http://schemas.microsoft.com/office/powerpoint/2010/main" val="2682755544"/>
+      </p:ext>
+    </p:extLst>
   </p:cSld>
   <p:clrMapOvr>
     <a:masterClrMapping/>
@@ -1150,7 +1150,7 @@
   <p:cSld>
     <p:spTree>
       <p:nvGrpSpPr>
-        <p:cNvPr id="1" name="Shape 188"/>
+        <p:cNvPr id="1" name="Shape 179"/>
         <p:cNvGrpSpPr/>
         <p:nvPr/>
       </p:nvGrpSpPr>
@@ -1164,7 +1164,7 @@
       </p:grpSpPr>
       <p:sp>
         <p:nvSpPr>
-          <p:cNvPr id="189" name="Google Shape;189;g243b168c69a_0_124:notes"/>
+          <p:cNvPr id="180" name="Google Shape;180;g243b168c69a_0_78:notes"/>
           <p:cNvSpPr>
             <a:spLocks noGrp="1" noRot="1" noChangeAspect="1"/>
           </p:cNvSpPr>
@@ -1205,7 +1205,7 @@
       </p:sp>
       <p:sp>
         <p:nvSpPr>
-          <p:cNvPr id="190" name="Google Shape;190;g243b168c69a_0_124:notes"/>
+          <p:cNvPr id="181" name="Google Shape;181;g243b168c69a_0_78:notes"/>
           <p:cNvSpPr txBox="1">
             <a:spLocks noGrp="1"/>
           </p:cNvSpPr>
@@ -1254,7 +1254,7 @@
   <p:cSld>
     <p:spTree>
       <p:nvGrpSpPr>
-        <p:cNvPr id="1" name="Shape 201"/>
+        <p:cNvPr id="1" name="Shape 188"/>
         <p:cNvGrpSpPr/>
         <p:nvPr/>
       </p:nvGrpSpPr>
@@ -1268,7 +1268,7 @@
       </p:grpSpPr>
       <p:sp>
         <p:nvSpPr>
-          <p:cNvPr id="202" name="Google Shape;202;g27d7db3d6e8_0_11:notes"/>
+          <p:cNvPr id="189" name="Google Shape;189;g243b168c69a_0_124:notes"/>
           <p:cNvSpPr>
             <a:spLocks noGrp="1" noRot="1" noChangeAspect="1"/>
           </p:cNvSpPr>
@@ -1309,7 +1309,7 @@
       </p:sp>
       <p:sp>
         <p:nvSpPr>
-          <p:cNvPr id="203" name="Google Shape;203;g27d7db3d6e8_0_11:notes"/>
+          <p:cNvPr id="190" name="Google Shape;190;g243b168c69a_0_124:notes"/>
           <p:cNvSpPr txBox="1">
             <a:spLocks noGrp="1"/>
           </p:cNvSpPr>
@@ -1358,7 +1358,7 @@
   <p:cSld>
     <p:spTree>
       <p:nvGrpSpPr>
-        <p:cNvPr id="1" name="Shape 207"/>
+        <p:cNvPr id="1" name="Shape 201"/>
         <p:cNvGrpSpPr/>
         <p:nvPr/>
       </p:nvGrpSpPr>
@@ -1372,7 +1372,7 @@
       </p:grpSpPr>
       <p:sp>
         <p:nvSpPr>
-          <p:cNvPr id="208" name="Google Shape;208;g27d7db3d6e8_0_27:notes"/>
+          <p:cNvPr id="202" name="Google Shape;202;g27d7db3d6e8_0_11:notes"/>
           <p:cNvSpPr>
             <a:spLocks noGrp="1" noRot="1" noChangeAspect="1"/>
           </p:cNvSpPr>
@@ -1413,7 +1413,7 @@
       </p:sp>
       <p:sp>
         <p:nvSpPr>
-          <p:cNvPr id="209" name="Google Shape;209;g27d7db3d6e8_0_27:notes"/>
+          <p:cNvPr id="203" name="Google Shape;203;g27d7db3d6e8_0_11:notes"/>
           <p:cNvSpPr txBox="1">
             <a:spLocks noGrp="1"/>
           </p:cNvSpPr>
@@ -1462,7 +1462,7 @@
   <p:cSld>
     <p:spTree>
       <p:nvGrpSpPr>
-        <p:cNvPr id="1" name="Shape 214"/>
+        <p:cNvPr id="1" name="Shape 207"/>
         <p:cNvGrpSpPr/>
         <p:nvPr/>
       </p:nvGrpSpPr>
@@ -1476,7 +1476,7 @@
       </p:grpSpPr>
       <p:sp>
         <p:nvSpPr>
-          <p:cNvPr id="215" name="Google Shape;215;g27d7db3d6e8_0_33:notes"/>
+          <p:cNvPr id="208" name="Google Shape;208;g27d7db3d6e8_0_27:notes"/>
           <p:cNvSpPr>
             <a:spLocks noGrp="1" noRot="1" noChangeAspect="1"/>
           </p:cNvSpPr>
@@ -1517,7 +1517,7 @@
       </p:sp>
       <p:sp>
         <p:nvSpPr>
-          <p:cNvPr id="216" name="Google Shape;216;g27d7db3d6e8_0_33:notes"/>
+          <p:cNvPr id="209" name="Google Shape;209;g27d7db3d6e8_0_27:notes"/>
           <p:cNvSpPr txBox="1">
             <a:spLocks noGrp="1"/>
           </p:cNvSpPr>
@@ -1566,7 +1566,7 @@
   <p:cSld>
     <p:spTree>
       <p:nvGrpSpPr>
-        <p:cNvPr id="1" name="Shape 221"/>
+        <p:cNvPr id="1" name="Shape 214"/>
         <p:cNvGrpSpPr/>
         <p:nvPr/>
       </p:nvGrpSpPr>
@@ -1580,7 +1580,7 @@
       </p:grpSpPr>
       <p:sp>
         <p:nvSpPr>
-          <p:cNvPr id="222" name="Google Shape;222;g27d7db3d6e8_0_47:notes"/>
+          <p:cNvPr id="215" name="Google Shape;215;g27d7db3d6e8_0_33:notes"/>
           <p:cNvSpPr>
             <a:spLocks noGrp="1" noRot="1" noChangeAspect="1"/>
           </p:cNvSpPr>
@@ -1621,7 +1621,7 @@
       </p:sp>
       <p:sp>
         <p:nvSpPr>
-          <p:cNvPr id="223" name="Google Shape;223;g27d7db3d6e8_0_47:notes"/>
+          <p:cNvPr id="216" name="Google Shape;216;g27d7db3d6e8_0_33:notes"/>
           <p:cNvSpPr txBox="1">
             <a:spLocks noGrp="1"/>
           </p:cNvSpPr>
@@ -1653,23 +1653,6 @@
               </a:spcAft>
               <a:buNone/>
             </a:pPr>
-            <a:r>
-              <a:rPr lang="en"/>
-              <a:t>EASTER EGG HERE: If you are reading this and wondering why we pipe the output of pthread_addsub to /dev/null instead of removing the printf statements from code, it is because removing printf statements causes a slowdown. I'm still not too sure why, Peigeng suggested it may be due to this: </a:t>
-            </a:r>
-            <a:r>
-              <a:rPr lang="en" u="sng">
-                <a:solidFill>
-                  <a:schemeClr val="hlink"/>
-                </a:solidFill>
-                <a:hlinkClick r:id="rId3"/>
-              </a:rPr>
-              <a:t>https://stackoverflow.com/questions/42358211/adding-a-print-statement-speeds-up-code-by-an-order-of-magnitude</a:t>
-            </a:r>
-            <a:r>
-              <a:rPr lang="en"/>
-              <a:t> but I still couldn't get rid of the slowdown despite following the suggestions in the answer.</a:t>
-            </a:r>
             <a:endParaRPr/>
           </a:p>
         </p:txBody>
@@ -1771,7 +1754,7 @@
   <p:cSld>
     <p:spTree>
       <p:nvGrpSpPr>
-        <p:cNvPr id="1" name="Shape 227"/>
+        <p:cNvPr id="1" name="Shape 221"/>
         <p:cNvGrpSpPr/>
         <p:nvPr/>
       </p:nvGrpSpPr>
@@ -1785,7 +1768,7 @@
       </p:grpSpPr>
       <p:sp>
         <p:nvSpPr>
-          <p:cNvPr id="228" name="Google Shape;228;g27d7db3d6e8_0_38:notes"/>
+          <p:cNvPr id="222" name="Google Shape;222;g27d7db3d6e8_0_47:notes"/>
           <p:cNvSpPr>
             <a:spLocks noGrp="1" noRot="1" noChangeAspect="1"/>
           </p:cNvSpPr>
@@ -1826,7 +1809,7 @@
       </p:sp>
       <p:sp>
         <p:nvSpPr>
-          <p:cNvPr id="229" name="Google Shape;229;g27d7db3d6e8_0_38:notes"/>
+          <p:cNvPr id="223" name="Google Shape;223;g27d7db3d6e8_0_47:notes"/>
           <p:cNvSpPr txBox="1">
             <a:spLocks noGrp="1"/>
           </p:cNvSpPr>
@@ -1858,6 +1841,23 @@
               </a:spcAft>
               <a:buNone/>
             </a:pPr>
+            <a:r>
+              <a:rPr lang="en"/>
+              <a:t>EASTER EGG HERE: If you are reading this and wondering why we pipe the output of pthread_addsub to /dev/null instead of removing the printf statements from code, it is because removing printf statements causes a slowdown. I'm still not too sure why, Peigeng suggested it may be due to this: </a:t>
+            </a:r>
+            <a:r>
+              <a:rPr lang="en" u="sng">
+                <a:solidFill>
+                  <a:schemeClr val="hlink"/>
+                </a:solidFill>
+                <a:hlinkClick r:id="rId3"/>
+              </a:rPr>
+              <a:t>https://stackoverflow.com/questions/42358211/adding-a-print-statement-speeds-up-code-by-an-order-of-magnitude</a:t>
+            </a:r>
+            <a:r>
+              <a:rPr lang="en"/>
+              <a:t> but I still couldn't get rid of the slowdown despite following the suggestions in the answer.</a:t>
+            </a:r>
             <a:endParaRPr/>
           </a:p>
         </p:txBody>
@@ -1967,11 +1967,6 @@
         </p:txBody>
       </p:sp>
     </p:spTree>
-    <p:extLst>
-      <p:ext uri="{BB962C8B-B14F-4D97-AF65-F5344CB8AC3E}">
-        <p14:creationId xmlns:p14="http://schemas.microsoft.com/office/powerpoint/2010/main" val="418000496"/>
-      </p:ext>
-    </p:extLst>
   </p:cSld>
   <p:clrMapOvr>
     <a:masterClrMapping/>
@@ -1984,7 +1979,7 @@
   <p:cSld>
     <p:spTree>
       <p:nvGrpSpPr>
-        <p:cNvPr id="1" name="Shape 257"/>
+        <p:cNvPr id="1" name="Shape 227"/>
         <p:cNvGrpSpPr/>
         <p:nvPr/>
       </p:nvGrpSpPr>
@@ -1998,7 +1993,7 @@
       </p:grpSpPr>
       <p:sp>
         <p:nvSpPr>
-          <p:cNvPr id="258" name="Google Shape;258;g243b168c69a_0_29:notes"/>
+          <p:cNvPr id="228" name="Google Shape;228;g27d7db3d6e8_0_38:notes"/>
           <p:cNvSpPr>
             <a:spLocks noGrp="1" noRot="1" noChangeAspect="1"/>
           </p:cNvSpPr>
@@ -2039,7 +2034,7 @@
       </p:sp>
       <p:sp>
         <p:nvSpPr>
-          <p:cNvPr id="259" name="Google Shape;259;g243b168c69a_0_29:notes"/>
+          <p:cNvPr id="229" name="Google Shape;229;g27d7db3d6e8_0_38:notes"/>
           <p:cNvSpPr txBox="1">
             <a:spLocks noGrp="1"/>
           </p:cNvSpPr>
@@ -2076,6 +2071,11 @@
         </p:txBody>
       </p:sp>
     </p:spTree>
+    <p:extLst>
+      <p:ext uri="{BB962C8B-B14F-4D97-AF65-F5344CB8AC3E}">
+        <p14:creationId xmlns:p14="http://schemas.microsoft.com/office/powerpoint/2010/main" val="418000496"/>
+      </p:ext>
+    </p:extLst>
   </p:cSld>
   <p:clrMapOvr>
     <a:masterClrMapping/>
@@ -2088,7 +2088,7 @@
   <p:cSld>
     <p:spTree>
       <p:nvGrpSpPr>
-        <p:cNvPr id="1" name="Shape 264"/>
+        <p:cNvPr id="1" name="Shape 257"/>
         <p:cNvGrpSpPr/>
         <p:nvPr/>
       </p:nvGrpSpPr>
@@ -2102,7 +2102,7 @@
       </p:grpSpPr>
       <p:sp>
         <p:nvSpPr>
-          <p:cNvPr id="265" name="Google Shape;265;g243b168c69a_0_101:notes"/>
+          <p:cNvPr id="258" name="Google Shape;258;g243b168c69a_0_29:notes"/>
           <p:cNvSpPr>
             <a:spLocks noGrp="1" noRot="1" noChangeAspect="1"/>
           </p:cNvSpPr>
@@ -2143,7 +2143,7 @@
       </p:sp>
       <p:sp>
         <p:nvSpPr>
-          <p:cNvPr id="266" name="Google Shape;266;g243b168c69a_0_101:notes"/>
+          <p:cNvPr id="259" name="Google Shape;259;g243b168c69a_0_29:notes"/>
           <p:cNvSpPr txBox="1">
             <a:spLocks noGrp="1"/>
           </p:cNvSpPr>
@@ -2192,7 +2192,7 @@
   <p:cSld>
     <p:spTree>
       <p:nvGrpSpPr>
-        <p:cNvPr id="1" name="Shape 270"/>
+        <p:cNvPr id="1" name="Shape 264"/>
         <p:cNvGrpSpPr/>
         <p:nvPr/>
       </p:nvGrpSpPr>
@@ -2206,7 +2206,7 @@
       </p:grpSpPr>
       <p:sp>
         <p:nvSpPr>
-          <p:cNvPr id="271" name="Google Shape;271;g243b168c69a_0_87:notes"/>
+          <p:cNvPr id="265" name="Google Shape;265;g243b168c69a_0_101:notes"/>
           <p:cNvSpPr>
             <a:spLocks noGrp="1" noRot="1" noChangeAspect="1"/>
           </p:cNvSpPr>
@@ -2247,7 +2247,7 @@
       </p:sp>
       <p:sp>
         <p:nvSpPr>
-          <p:cNvPr id="272" name="Google Shape;272;g243b168c69a_0_87:notes"/>
+          <p:cNvPr id="266" name="Google Shape;266;g243b168c69a_0_101:notes"/>
           <p:cNvSpPr txBox="1">
             <a:spLocks noGrp="1"/>
           </p:cNvSpPr>
@@ -2279,10 +2279,6 @@
               </a:spcAft>
               <a:buNone/>
             </a:pPr>
-            <a:r>
-              <a:rPr lang="en"/>
-              <a:t>Demo ex9 at the end</a:t>
-            </a:r>
             <a:endParaRPr/>
           </a:p>
         </p:txBody>
@@ -2300,7 +2296,7 @@
   <p:cSld>
     <p:spTree>
       <p:nvGrpSpPr>
-        <p:cNvPr id="1" name="Shape 283"/>
+        <p:cNvPr id="1" name="Shape 270"/>
         <p:cNvGrpSpPr/>
         <p:nvPr/>
       </p:nvGrpSpPr>
@@ -2314,7 +2310,7 @@
       </p:grpSpPr>
       <p:sp>
         <p:nvSpPr>
-          <p:cNvPr id="284" name="Google Shape;284;g27d7db3d6e8_0_66:notes"/>
+          <p:cNvPr id="271" name="Google Shape;271;g243b168c69a_0_87:notes"/>
           <p:cNvSpPr>
             <a:spLocks noGrp="1" noRot="1" noChangeAspect="1"/>
           </p:cNvSpPr>
@@ -2355,7 +2351,7 @@
       </p:sp>
       <p:sp>
         <p:nvSpPr>
-          <p:cNvPr id="285" name="Google Shape;285;g27d7db3d6e8_0_66:notes"/>
+          <p:cNvPr id="272" name="Google Shape;272;g243b168c69a_0_87:notes"/>
           <p:cNvSpPr txBox="1">
             <a:spLocks noGrp="1"/>
           </p:cNvSpPr>
@@ -2388,10 +2384,10 @@
               <a:buNone/>
             </a:pPr>
             <a:r>
-              <a:rPr lang="en" sz="2000" b="1"/>
-              <a:t>INCLUDES HINTS FOR EX10</a:t>
-            </a:r>
-            <a:endParaRPr sz="2000" b="1"/>
+              <a:rPr lang="en"/>
+              <a:t>Demo ex9 at the end</a:t>
+            </a:r>
+            <a:endParaRPr/>
           </a:p>
         </p:txBody>
       </p:sp>
@@ -2408,7 +2404,7 @@
   <p:cSld>
     <p:spTree>
       <p:nvGrpSpPr>
-        <p:cNvPr id="1" name="Shape 288"/>
+        <p:cNvPr id="1" name="Shape 283"/>
         <p:cNvGrpSpPr/>
         <p:nvPr/>
       </p:nvGrpSpPr>
@@ -2422,7 +2418,7 @@
       </p:grpSpPr>
       <p:sp>
         <p:nvSpPr>
-          <p:cNvPr id="289" name="Google Shape;289;g27d7db3d6e8_0_73:notes"/>
+          <p:cNvPr id="284" name="Google Shape;284;g27d7db3d6e8_0_66:notes"/>
           <p:cNvSpPr>
             <a:spLocks noGrp="1" noRot="1" noChangeAspect="1"/>
           </p:cNvSpPr>
@@ -2463,7 +2459,7 @@
       </p:sp>
       <p:sp>
         <p:nvSpPr>
-          <p:cNvPr id="290" name="Google Shape;290;g27d7db3d6e8_0_73:notes"/>
+          <p:cNvPr id="285" name="Google Shape;285;g27d7db3d6e8_0_66:notes"/>
           <p:cNvSpPr txBox="1">
             <a:spLocks noGrp="1"/>
           </p:cNvSpPr>
@@ -2495,7 +2491,11 @@
               </a:spcAft>
               <a:buNone/>
             </a:pPr>
-            <a:endParaRPr/>
+            <a:r>
+              <a:rPr lang="en" sz="2000" b="1"/>
+              <a:t>INCLUDES HINTS FOR EX10</a:t>
+            </a:r>
+            <a:endParaRPr sz="2000" b="1"/>
           </a:p>
         </p:txBody>
       </p:sp>
@@ -2512,7 +2512,7 @@
   <p:cSld>
     <p:spTree>
       <p:nvGrpSpPr>
-        <p:cNvPr id="1" name="Shape 294"/>
+        <p:cNvPr id="1" name="Shape 288"/>
         <p:cNvGrpSpPr/>
         <p:nvPr/>
       </p:nvGrpSpPr>
@@ -2526,7 +2526,7 @@
       </p:grpSpPr>
       <p:sp>
         <p:nvSpPr>
-          <p:cNvPr id="295" name="Google Shape;295;g27d7db3d6e8_0_80:notes"/>
+          <p:cNvPr id="289" name="Google Shape;289;g27d7db3d6e8_0_73:notes"/>
           <p:cNvSpPr>
             <a:spLocks noGrp="1" noRot="1" noChangeAspect="1"/>
           </p:cNvSpPr>
@@ -2567,7 +2567,7 @@
       </p:sp>
       <p:sp>
         <p:nvSpPr>
-          <p:cNvPr id="296" name="Google Shape;296;g27d7db3d6e8_0_80:notes"/>
+          <p:cNvPr id="290" name="Google Shape;290;g27d7db3d6e8_0_73:notes"/>
           <p:cNvSpPr txBox="1">
             <a:spLocks noGrp="1"/>
           </p:cNvSpPr>
@@ -2616,7 +2616,7 @@
   <p:cSld>
     <p:spTree>
       <p:nvGrpSpPr>
-        <p:cNvPr id="1" name="Shape 300"/>
+        <p:cNvPr id="1" name="Shape 294"/>
         <p:cNvGrpSpPr/>
         <p:nvPr/>
       </p:nvGrpSpPr>
@@ -2630,7 +2630,7 @@
       </p:grpSpPr>
       <p:sp>
         <p:nvSpPr>
-          <p:cNvPr id="301" name="Google Shape;301;g27d7db3d6e8_0_86:notes"/>
+          <p:cNvPr id="295" name="Google Shape;295;g27d7db3d6e8_0_80:notes"/>
           <p:cNvSpPr>
             <a:spLocks noGrp="1" noRot="1" noChangeAspect="1"/>
           </p:cNvSpPr>
@@ -2671,7 +2671,7 @@
       </p:sp>
       <p:sp>
         <p:nvSpPr>
-          <p:cNvPr id="302" name="Google Shape;302;g27d7db3d6e8_0_86:notes"/>
+          <p:cNvPr id="296" name="Google Shape;296;g27d7db3d6e8_0_80:notes"/>
           <p:cNvSpPr txBox="1">
             <a:spLocks noGrp="1"/>
           </p:cNvSpPr>
@@ -2720,7 +2720,7 @@
   <p:cSld>
     <p:spTree>
       <p:nvGrpSpPr>
-        <p:cNvPr id="1" name="Shape 308"/>
+        <p:cNvPr id="1" name="Shape 300"/>
         <p:cNvGrpSpPr/>
         <p:nvPr/>
       </p:nvGrpSpPr>
@@ -2734,7 +2734,7 @@
       </p:grpSpPr>
       <p:sp>
         <p:nvSpPr>
-          <p:cNvPr id="309" name="Google Shape;309;g27dd1d236e9_2_0:notes"/>
+          <p:cNvPr id="301" name="Google Shape;301;g27d7db3d6e8_0_86:notes"/>
           <p:cNvSpPr>
             <a:spLocks noGrp="1" noRot="1" noChangeAspect="1"/>
           </p:cNvSpPr>
@@ -2775,7 +2775,7 @@
       </p:sp>
       <p:sp>
         <p:nvSpPr>
-          <p:cNvPr id="310" name="Google Shape;310;g27dd1d236e9_2_0:notes"/>
+          <p:cNvPr id="302" name="Google Shape;302;g27d7db3d6e8_0_86:notes"/>
           <p:cNvSpPr txBox="1">
             <a:spLocks noGrp="1"/>
           </p:cNvSpPr>
@@ -2928,7 +2928,7 @@
   <p:cSld>
     <p:spTree>
       <p:nvGrpSpPr>
-        <p:cNvPr id="1" name="Shape 316"/>
+        <p:cNvPr id="1" name="Shape 308"/>
         <p:cNvGrpSpPr/>
         <p:nvPr/>
       </p:nvGrpSpPr>
@@ -2942,7 +2942,7 @@
       </p:grpSpPr>
       <p:sp>
         <p:nvSpPr>
-          <p:cNvPr id="317" name="Google Shape;317;g243b168c69a_0_132:notes"/>
+          <p:cNvPr id="309" name="Google Shape;309;g27dd1d236e9_2_0:notes"/>
           <p:cNvSpPr>
             <a:spLocks noGrp="1" noRot="1" noChangeAspect="1"/>
           </p:cNvSpPr>
@@ -2983,7 +2983,7 @@
       </p:sp>
       <p:sp>
         <p:nvSpPr>
-          <p:cNvPr id="318" name="Google Shape;318;g243b168c69a_0_132:notes"/>
+          <p:cNvPr id="310" name="Google Shape;310;g27dd1d236e9_2_0:notes"/>
           <p:cNvSpPr txBox="1">
             <a:spLocks noGrp="1"/>
           </p:cNvSpPr>
@@ -3032,7 +3032,7 @@
   <p:cSld>
     <p:spTree>
       <p:nvGrpSpPr>
-        <p:cNvPr id="1" name="Shape 323"/>
+        <p:cNvPr id="1" name="Shape 316"/>
         <p:cNvGrpSpPr/>
         <p:nvPr/>
       </p:nvGrpSpPr>
@@ -3046,7 +3046,7 @@
       </p:grpSpPr>
       <p:sp>
         <p:nvSpPr>
-          <p:cNvPr id="324" name="Google Shape;324;g243b168c69a_0_106:notes"/>
+          <p:cNvPr id="317" name="Google Shape;317;g243b168c69a_0_132:notes"/>
           <p:cNvSpPr>
             <a:spLocks noGrp="1" noRot="1" noChangeAspect="1"/>
           </p:cNvSpPr>
@@ -3087,7 +3087,7 @@
       </p:sp>
       <p:sp>
         <p:nvSpPr>
-          <p:cNvPr id="325" name="Google Shape;325;g243b168c69a_0_106:notes"/>
+          <p:cNvPr id="318" name="Google Shape;318;g243b168c69a_0_132:notes"/>
           <p:cNvSpPr txBox="1">
             <a:spLocks noGrp="1"/>
           </p:cNvSpPr>
@@ -3136,7 +3136,7 @@
   <p:cSld>
     <p:spTree>
       <p:nvGrpSpPr>
-        <p:cNvPr id="1" name="Shape 601"/>
+        <p:cNvPr id="1" name="Shape 323"/>
         <p:cNvGrpSpPr/>
         <p:nvPr/>
       </p:nvGrpSpPr>
@@ -3150,7 +3150,7 @@
       </p:grpSpPr>
       <p:sp>
         <p:nvSpPr>
-          <p:cNvPr id="602" name="Google Shape;602;ga006735cba_0_249:notes"/>
+          <p:cNvPr id="324" name="Google Shape;324;g243b168c69a_0_106:notes"/>
           <p:cNvSpPr>
             <a:spLocks noGrp="1" noRot="1" noChangeAspect="1"/>
           </p:cNvSpPr>
@@ -3191,7 +3191,7 @@
       </p:sp>
       <p:sp>
         <p:nvSpPr>
-          <p:cNvPr id="603" name="Google Shape;603;ga006735cba_0_249:notes"/>
+          <p:cNvPr id="325" name="Google Shape;325;g243b168c69a_0_106:notes"/>
           <p:cNvSpPr txBox="1">
             <a:spLocks noGrp="1"/>
           </p:cNvSpPr>
@@ -3236,6 +3236,110 @@
 </file>
 
 <file path=ppt/notesSlides/notesSlide33.xml><?xml version="1.0" encoding="utf-8"?>
+<p:notes xmlns:a="http://schemas.openxmlformats.org/drawingml/2006/main" xmlns:r="http://schemas.openxmlformats.org/officeDocument/2006/relationships" xmlns:p="http://schemas.openxmlformats.org/presentationml/2006/main" showMasterSp="0" showMasterPhAnim="0">
+  <p:cSld>
+    <p:spTree>
+      <p:nvGrpSpPr>
+        <p:cNvPr id="1" name="Shape 601"/>
+        <p:cNvGrpSpPr/>
+        <p:nvPr/>
+      </p:nvGrpSpPr>
+      <p:grpSpPr>
+        <a:xfrm>
+          <a:off x="0" y="0"/>
+          <a:ext cx="0" cy="0"/>
+          <a:chOff x="0" y="0"/>
+          <a:chExt cx="0" cy="0"/>
+        </a:xfrm>
+      </p:grpSpPr>
+      <p:sp>
+        <p:nvSpPr>
+          <p:cNvPr id="602" name="Google Shape;602;ga006735cba_0_249:notes"/>
+          <p:cNvSpPr>
+            <a:spLocks noGrp="1" noRot="1" noChangeAspect="1"/>
+          </p:cNvSpPr>
+          <p:nvPr>
+            <p:ph type="sldImg" idx="2"/>
+          </p:nvPr>
+        </p:nvSpPr>
+        <p:spPr>
+          <a:xfrm>
+            <a:off x="381000" y="685800"/>
+            <a:ext cx="6096000" cy="3429000"/>
+          </a:xfrm>
+          <a:custGeom>
+            <a:avLst/>
+            <a:gdLst/>
+            <a:ahLst/>
+            <a:cxnLst/>
+            <a:rect l="l" t="t" r="r" b="b"/>
+            <a:pathLst>
+              <a:path w="120000" h="120000" extrusionOk="0">
+                <a:moveTo>
+                  <a:pt x="0" y="0"/>
+                </a:moveTo>
+                <a:lnTo>
+                  <a:pt x="120000" y="0"/>
+                </a:lnTo>
+                <a:lnTo>
+                  <a:pt x="120000" y="120000"/>
+                </a:lnTo>
+                <a:lnTo>
+                  <a:pt x="0" y="120000"/>
+                </a:lnTo>
+                <a:close/>
+              </a:path>
+            </a:pathLst>
+          </a:custGeom>
+        </p:spPr>
+      </p:sp>
+      <p:sp>
+        <p:nvSpPr>
+          <p:cNvPr id="603" name="Google Shape;603;ga006735cba_0_249:notes"/>
+          <p:cNvSpPr txBox="1">
+            <a:spLocks noGrp="1"/>
+          </p:cNvSpPr>
+          <p:nvPr>
+            <p:ph type="body" idx="1"/>
+          </p:nvPr>
+        </p:nvSpPr>
+        <p:spPr>
+          <a:xfrm>
+            <a:off x="685800" y="4343400"/>
+            <a:ext cx="5486400" cy="4114800"/>
+          </a:xfrm>
+          <a:prstGeom prst="rect">
+            <a:avLst/>
+          </a:prstGeom>
+        </p:spPr>
+        <p:txBody>
+          <a:bodyPr spcFirstLastPara="1" wrap="square" lIns="91425" tIns="91425" rIns="91425" bIns="91425" anchor="t" anchorCtr="0">
+            <a:noAutofit/>
+          </a:bodyPr>
+          <a:lstStyle/>
+          <a:p>
+            <a:pPr marL="0" lvl="0" indent="0" algn="l" rtl="0">
+              <a:spcBef>
+                <a:spcPts val="0"/>
+              </a:spcBef>
+              <a:spcAft>
+                <a:spcPts val="0"/>
+              </a:spcAft>
+              <a:buNone/>
+            </a:pPr>
+            <a:endParaRPr/>
+          </a:p>
+        </p:txBody>
+      </p:sp>
+    </p:spTree>
+  </p:cSld>
+  <p:clrMapOvr>
+    <a:masterClrMapping/>
+  </p:clrMapOvr>
+</p:notes>
+</file>
+
+<file path=ppt/notesSlides/notesSlide34.xml><?xml version="1.0" encoding="utf-8"?>
 <p:notes xmlns:a="http://schemas.openxmlformats.org/drawingml/2006/main" xmlns:r="http://schemas.openxmlformats.org/officeDocument/2006/relationships" xmlns:p="http://schemas.openxmlformats.org/presentationml/2006/main">
   <p:cSld>
     <p:spTree>
@@ -3736,6 +3840,131 @@
 </file>
 
 <file path=ppt/notesSlides/notesSlide8.xml><?xml version="1.0" encoding="utf-8"?>
+<p:notes xmlns:a="http://schemas.openxmlformats.org/drawingml/2006/main" xmlns:r="http://schemas.openxmlformats.org/officeDocument/2006/relationships" xmlns:p="http://schemas.openxmlformats.org/presentationml/2006/main">
+  <p:cSld>
+    <p:spTree>
+      <p:nvGrpSpPr>
+        <p:cNvPr id="1" name=""/>
+        <p:cNvGrpSpPr/>
+        <p:nvPr/>
+      </p:nvGrpSpPr>
+      <p:grpSpPr>
+        <a:xfrm>
+          <a:off x="0" y="0"/>
+          <a:ext cx="0" cy="0"/>
+          <a:chOff x="0" y="0"/>
+          <a:chExt cx="0" cy="0"/>
+        </a:xfrm>
+      </p:grpSpPr>
+      <p:sp>
+        <p:nvSpPr>
+          <p:cNvPr id="2" name="Slide Image Placeholder 1"/>
+          <p:cNvSpPr>
+            <a:spLocks noGrp="1" noRot="1" noChangeAspect="1"/>
+          </p:cNvSpPr>
+          <p:nvPr>
+            <p:ph type="sldImg"/>
+          </p:nvPr>
+        </p:nvSpPr>
+        <p:spPr/>
+      </p:sp>
+      <p:sp>
+        <p:nvSpPr>
+          <p:cNvPr id="3" name="Notes Placeholder 2"/>
+          <p:cNvSpPr>
+            <a:spLocks noGrp="1"/>
+          </p:cNvSpPr>
+          <p:nvPr>
+            <p:ph type="body" idx="1"/>
+          </p:nvPr>
+        </p:nvSpPr>
+        <p:spPr/>
+        <p:txBody>
+          <a:bodyPr/>
+          <a:lstStyle/>
+          <a:p>
+            <a:r>
+              <a:rPr lang="en-US"/>
+              <a:t>
+Poll Title: Do not modify the notes in this section to avoid tampering with the Poll Everywhere activity.
+More info at polleverywhere.com/support
+What kind of parallel pattern does OpenMP use?
+https://www.polleverywhere.com/multiple_choice_polls/PIfzBBNOC9q2rnbfjbFY5?state=opened&amp;flow=Default&amp;onscreen=persist</a:t>
+            </a:r>
+            <a:endParaRPr lang="en-SG"/>
+          </a:p>
+        </p:txBody>
+      </p:sp>
+      <p:sp>
+        <p:nvSpPr>
+          <p:cNvPr id="4" name="Slide Number Placeholder 3"/>
+          <p:cNvSpPr>
+            <a:spLocks noGrp="1"/>
+          </p:cNvSpPr>
+          <p:nvPr>
+            <p:ph type="sldNum" sz="quarter" idx="5"/>
+          </p:nvPr>
+        </p:nvSpPr>
+        <p:spPr/>
+        <p:txBody>
+          <a:bodyPr/>
+          <a:lstStyle/>
+          <a:p>
+            <a:fld id="{D17C5EEA-D671-4453-97C7-AF6A67BC87D3}" type="slidenum">
+              <a:rPr lang="en-US" smtClean="0"/>
+              <a:pPr/>
+              <a:t>14</a:t>
+            </a:fld>
+            <a:endParaRPr lang="en-US"/>
+          </a:p>
+        </p:txBody>
+      </p:sp>
+      <p:sp>
+        <p:nvSpPr>
+          <p:cNvPr id="5" name="TextBox 4">
+            <a:extLst>
+              <a:ext uri="{FF2B5EF4-FFF2-40B4-BE49-F238E27FC236}">
+                <a16:creationId xmlns:a16="http://schemas.microsoft.com/office/drawing/2014/main" id="{883C7A52-AF80-8A84-0058-E8E6390655D8}"/>
+              </a:ext>
+            </a:extLst>
+          </p:cNvPr>
+          <p:cNvSpPr txBox="1"/>
+          <p:nvPr/>
+        </p:nvSpPr>
+        <p:spPr>
+          <a:xfrm>
+            <a:off x="0" y="0"/>
+            <a:ext cx="3810000" cy="1270000"/>
+          </a:xfrm>
+          <a:prstGeom prst="rect">
+            <a:avLst/>
+          </a:prstGeom>
+          <a:noFill/>
+        </p:spPr>
+        <p:txBody>
+          <a:bodyPr vert="horz" rtlCol="0">
+            <a:spAutoFit/>
+          </a:bodyPr>
+          <a:lstStyle/>
+          <a:p>
+            <a:endParaRPr lang="en-SG"/>
+          </a:p>
+        </p:txBody>
+      </p:sp>
+    </p:spTree>
+    <p:extLst>
+      <p:ext uri="{BB962C8B-B14F-4D97-AF65-F5344CB8AC3E}">
+        <p14:creationId xmlns:p14="http://schemas.microsoft.com/office/powerpoint/2010/main" val="1936714621"/>
+      </p:ext>
+    </p:extLst>
+  </p:cSld>
+  <p:clrMapOvr>
+    <a:masterClrMapping/>
+  </p:clrMapOvr>
+</p:notes>
+</file>
+
+<file path=ppt/notesSlides/notesSlide9.xml><?xml version="1.0" encoding="utf-8"?>
 <p:notes xmlns:a="http://schemas.openxmlformats.org/drawingml/2006/main" xmlns:r="http://schemas.openxmlformats.org/officeDocument/2006/relationships" xmlns:p="http://schemas.openxmlformats.org/presentationml/2006/main" showMasterSp="0" showMasterPhAnim="0">
   <p:cSld>
     <p:spTree>
@@ -3796,110 +4025,6 @@
       <p:sp>
         <p:nvSpPr>
           <p:cNvPr id="138" name="Google Shape;138;g243b168c69a_0_40:notes"/>
-          <p:cNvSpPr txBox="1">
-            <a:spLocks noGrp="1"/>
-          </p:cNvSpPr>
-          <p:nvPr>
-            <p:ph type="body" idx="1"/>
-          </p:nvPr>
-        </p:nvSpPr>
-        <p:spPr>
-          <a:xfrm>
-            <a:off x="685800" y="4343400"/>
-            <a:ext cx="5486400" cy="4114800"/>
-          </a:xfrm>
-          <a:prstGeom prst="rect">
-            <a:avLst/>
-          </a:prstGeom>
-        </p:spPr>
-        <p:txBody>
-          <a:bodyPr spcFirstLastPara="1" wrap="square" lIns="91425" tIns="91425" rIns="91425" bIns="91425" anchor="t" anchorCtr="0">
-            <a:noAutofit/>
-          </a:bodyPr>
-          <a:lstStyle/>
-          <a:p>
-            <a:pPr marL="0" lvl="0" indent="0" algn="l" rtl="0">
-              <a:spcBef>
-                <a:spcPts val="0"/>
-              </a:spcBef>
-              <a:spcAft>
-                <a:spcPts val="0"/>
-              </a:spcAft>
-              <a:buNone/>
-            </a:pPr>
-            <a:endParaRPr/>
-          </a:p>
-        </p:txBody>
-      </p:sp>
-    </p:spTree>
-  </p:cSld>
-  <p:clrMapOvr>
-    <a:masterClrMapping/>
-  </p:clrMapOvr>
-</p:notes>
-</file>
-
-<file path=ppt/notesSlides/notesSlide9.xml><?xml version="1.0" encoding="utf-8"?>
-<p:notes xmlns:a="http://schemas.openxmlformats.org/drawingml/2006/main" xmlns:r="http://schemas.openxmlformats.org/officeDocument/2006/relationships" xmlns:p="http://schemas.openxmlformats.org/presentationml/2006/main" showMasterSp="0" showMasterPhAnim="0">
-  <p:cSld>
-    <p:spTree>
-      <p:nvGrpSpPr>
-        <p:cNvPr id="1" name="Shape 142"/>
-        <p:cNvGrpSpPr/>
-        <p:nvPr/>
-      </p:nvGrpSpPr>
-      <p:grpSpPr>
-        <a:xfrm>
-          <a:off x="0" y="0"/>
-          <a:ext cx="0" cy="0"/>
-          <a:chOff x="0" y="0"/>
-          <a:chExt cx="0" cy="0"/>
-        </a:xfrm>
-      </p:grpSpPr>
-      <p:sp>
-        <p:nvSpPr>
-          <p:cNvPr id="143" name="Google Shape;143;g243b168c69a_0_45:notes"/>
-          <p:cNvSpPr>
-            <a:spLocks noGrp="1" noRot="1" noChangeAspect="1"/>
-          </p:cNvSpPr>
-          <p:nvPr>
-            <p:ph type="sldImg" idx="2"/>
-          </p:nvPr>
-        </p:nvSpPr>
-        <p:spPr>
-          <a:xfrm>
-            <a:off x="381000" y="685800"/>
-            <a:ext cx="6096000" cy="3429000"/>
-          </a:xfrm>
-          <a:custGeom>
-            <a:avLst/>
-            <a:gdLst/>
-            <a:ahLst/>
-            <a:cxnLst/>
-            <a:rect l="l" t="t" r="r" b="b"/>
-            <a:pathLst>
-              <a:path w="120000" h="120000" extrusionOk="0">
-                <a:moveTo>
-                  <a:pt x="0" y="0"/>
-                </a:moveTo>
-                <a:lnTo>
-                  <a:pt x="120000" y="0"/>
-                </a:lnTo>
-                <a:lnTo>
-                  <a:pt x="120000" y="120000"/>
-                </a:lnTo>
-                <a:lnTo>
-                  <a:pt x="0" y="120000"/>
-                </a:lnTo>
-                <a:close/>
-              </a:path>
-            </a:pathLst>
-          </a:custGeom>
-        </p:spPr>
-      </p:sp>
-      <p:sp>
-        <p:nvSpPr>
-          <p:cNvPr id="144" name="Google Shape;144;g243b168c69a_0_45:notes"/>
           <p:cNvSpPr txBox="1">
             <a:spLocks noGrp="1"/>
           </p:cNvSpPr>
@@ -10353,63 +10478,50 @@
           <a:chExt cx="0" cy="0"/>
         </a:xfrm>
       </p:grpSpPr>
-      <p:sp>
-        <p:nvSpPr>
-          <p:cNvPr id="2" name="Title 1">
+      <p:pic>
+        <p:nvPicPr>
+          <p:cNvPr id="3" name="Picture 2">
             <a:extLst>
               <a:ext uri="{FF2B5EF4-FFF2-40B4-BE49-F238E27FC236}">
-                <a16:creationId xmlns:a16="http://schemas.microsoft.com/office/drawing/2014/main" id="{30F44051-6C8F-4248-9D1E-45FC59BC241E}"/>
+                <a16:creationId xmlns:a16="http://schemas.microsoft.com/office/drawing/2014/main" id="{16A269E8-29BA-CB11-924B-DF7D7B30E25C}"/>
               </a:ext>
             </a:extLst>
           </p:cNvPr>
-          <p:cNvSpPr>
-            <a:spLocks noGrp="1"/>
-          </p:cNvSpPr>
-          <p:nvPr>
-            <p:ph type="title"/>
-          </p:nvPr>
-        </p:nvSpPr>
-        <p:spPr/>
-        <p:txBody>
-          <a:bodyPr/>
-          <a:lstStyle/>
-          <a:p>
-            <a:r>
-              <a:rPr lang="en-SG"/>
-              <a:t>pollev</a:t>
-            </a:r>
-          </a:p>
-        </p:txBody>
-      </p:sp>
-      <p:sp>
-        <p:nvSpPr>
-          <p:cNvPr id="3" name="Content Placeholder 2">
+          <p:cNvPicPr>
+            <a:picLocks/>
+          </p:cNvPicPr>
+          <p:nvPr>
+            <p:custDataLst>
+              <p:tags r:id="rId1"/>
+            </p:custDataLst>
+          </p:nvPr>
+        </p:nvPicPr>
+        <p:blipFill>
+          <a:blip r:embed="rId4">
             <a:extLst>
-              <a:ext uri="{FF2B5EF4-FFF2-40B4-BE49-F238E27FC236}">
-                <a16:creationId xmlns:a16="http://schemas.microsoft.com/office/drawing/2014/main" id="{09C278C5-4E86-495F-5E22-1484CBF562F3}"/>
+              <a:ext uri="{28A0092B-C50C-407E-A947-70E740481C1C}">
+                <a14:useLocalDpi xmlns:a14="http://schemas.microsoft.com/office/drawing/2010/main" val="0"/>
               </a:ext>
             </a:extLst>
-          </p:cNvPr>
-          <p:cNvSpPr>
-            <a:spLocks noGrp="1"/>
-          </p:cNvSpPr>
-          <p:nvPr>
-            <p:ph idx="1"/>
-          </p:nvPr>
-        </p:nvSpPr>
-        <p:spPr/>
-        <p:txBody>
-          <a:bodyPr/>
-          <a:lstStyle/>
-          <a:p>
-            <a:endParaRPr lang="en-SG"/>
-          </a:p>
-        </p:txBody>
-      </p:sp>
+          </a:blip>
+          <a:stretch>
+            <a:fillRect/>
+          </a:stretch>
+        </p:blipFill>
+        <p:spPr>
+          <a:xfrm>
+            <a:off x="190500" y="190500"/>
+            <a:ext cx="11811000" cy="6477000"/>
+          </a:xfrm>
+          <a:prstGeom prst="rect">
+            <a:avLst/>
+          </a:prstGeom>
+        </p:spPr>
+      </p:pic>
     </p:spTree>
     <p:extLst>
       <p:ext uri="{BB962C8B-B14F-4D97-AF65-F5344CB8AC3E}">
-        <p14:creationId xmlns:p14="http://schemas.microsoft.com/office/powerpoint/2010/main" val="1400248195"/>
+        <p14:creationId xmlns:p14="http://schemas.microsoft.com/office/powerpoint/2010/main" val="408955894"/>
       </p:ext>
     </p:extLst>
   </p:cSld>
@@ -11451,7 +11563,7 @@
           <a:p>
             <a:r>
               <a:rPr lang="en-US"/>
-              <a:t>After first tutorial :)</a:t>
+              <a:t>After previous tutorial :)</a:t>
             </a:r>
             <a:endParaRPr lang="en-US" dirty="0"/>
           </a:p>
@@ -12501,7 +12613,19 @@
           <a:p>
             <a:r>
               <a:rPr lang="en"/>
-              <a:t>Live Demo: Tut 1's pthread_addsub results</a:t>
+              <a:t>Live Demo: Tut 1's </a:t>
+            </a:r>
+            <a:r>
+              <a:rPr lang="en" sz="4000">
+                <a:latin typeface="Iosevka Extended" panose="02000509030000000004" pitchFamily="49" charset="0"/>
+                <a:ea typeface="Iosevka Extended" panose="02000509030000000004" pitchFamily="49" charset="0"/>
+                <a:cs typeface="Iosevka Extended" panose="02000509030000000004" pitchFamily="49" charset="0"/>
+              </a:rPr>
+              <a:t>pthread_addsub</a:t>
+            </a:r>
+            <a:r>
+              <a:rPr lang="en"/>
+              <a:t> results</a:t>
             </a:r>
             <a:endParaRPr/>
           </a:p>
@@ -12545,7 +12669,7 @@
               <a:rPr lang="en">
                 <a:latin typeface="AndesNeue Alt 2 Medium" panose="00000600000000000000" pitchFamily="2" charset="0"/>
               </a:rPr>
-              <a:t>4.266s</a:t>
+              <a:t>5.565s</a:t>
             </a:r>
             <a:endParaRPr>
               <a:latin typeface="AndesNeue Alt 2 Medium" panose="00000600000000000000" pitchFamily="2" charset="0"/>
@@ -12572,7 +12696,7 @@
               <a:rPr lang="en">
                 <a:latin typeface="AndesNeue Alt 2 Medium" panose="00000600000000000000" pitchFamily="2" charset="0"/>
               </a:rPr>
-              <a:t>4.7163s</a:t>
+              <a:t>6.374s</a:t>
             </a:r>
             <a:endParaRPr>
               <a:latin typeface="AndesNeue Alt 2 Medium" panose="00000600000000000000" pitchFamily="2" charset="0"/>
@@ -12599,7 +12723,7 @@
               <a:rPr lang="en">
                 <a:latin typeface="AndesNeue Alt 2 Medium" panose="00000600000000000000" pitchFamily="2" charset="0"/>
               </a:rPr>
-              <a:t>6.0608s</a:t>
+              <a:t>6.8194s</a:t>
             </a:r>
             <a:endParaRPr>
               <a:latin typeface="AndesNeue Alt 2 Medium" panose="00000600000000000000" pitchFamily="2" charset="0"/>
@@ -12626,7 +12750,7 @@
               <a:rPr lang="en">
                 <a:latin typeface="AndesNeue Alt 2 Medium" panose="00000600000000000000" pitchFamily="2" charset="0"/>
               </a:rPr>
-              <a:t>4.8317s</a:t>
+              <a:t>5.21152s</a:t>
             </a:r>
             <a:endParaRPr>
               <a:latin typeface="AndesNeue Alt 2 Medium" panose="00000600000000000000" pitchFamily="2" charset="0"/>
@@ -12653,7 +12777,7 @@
               <a:rPr lang="en">
                 <a:latin typeface="AndesNeue Alt 2 Medium" panose="00000600000000000000" pitchFamily="2" charset="0"/>
               </a:rPr>
-              <a:t>1.4197s</a:t>
+              <a:t>1.3826s</a:t>
             </a:r>
             <a:endParaRPr>
               <a:latin typeface="AndesNeue Alt 2 Medium" panose="00000600000000000000" pitchFamily="2" charset="0"/>
@@ -12692,7 +12816,7 @@
                 <a:cs typeface="Iosevka Extended" panose="02000509030000000004" pitchFamily="49" charset="0"/>
                 <a:sym typeface="Consolas"/>
               </a:rPr>
-              <a:t>tail -n +1 i7-7700.out i7-9700.out xs4114.out xw2245.out i7-13700.out</a:t>
+              <a:t>tail -n +1 *.out</a:t>
             </a:r>
             <a:endParaRPr sz="1721" b="1">
               <a:latin typeface="Iosevka Extended" panose="02000509030000000004" pitchFamily="49" charset="0"/>
@@ -12721,7 +12845,7 @@
                 </a:solidFill>
                 <a:latin typeface="AndesNeue Alt 2 Medium" panose="00000600000000000000" pitchFamily="2" charset="0"/>
               </a:rPr>
-              <a:t>Why does is i7-7700 faster than i7-9700 &amp; Xeon 4114?</a:t>
+              <a:t>Why does i7-7700 run faster than i7-9700 &amp; Xeon 4114?</a:t>
             </a:r>
             <a:br>
               <a:rPr lang="en">
@@ -12886,7 +13010,19 @@
           <a:p>
             <a:r>
               <a:rPr lang="en"/>
-              <a:t>Live Demo: Tut 1's pthread_addsub results</a:t>
+              <a:t>Live Demo: Tut 1's </a:t>
+            </a:r>
+            <a:r>
+              <a:rPr lang="en" sz="4000">
+                <a:latin typeface="Iosevka Extended" panose="02000509030000000004" pitchFamily="49" charset="0"/>
+                <a:ea typeface="Iosevka Extended" panose="02000509030000000004" pitchFamily="49" charset="0"/>
+                <a:cs typeface="Iosevka Extended" panose="02000509030000000004" pitchFamily="49" charset="0"/>
+              </a:rPr>
+              <a:t>pthread_addsub</a:t>
+            </a:r>
+            <a:r>
+              <a:rPr lang="en"/>
+              <a:t> results</a:t>
             </a:r>
             <a:endParaRPr/>
           </a:p>
@@ -12918,7 +13054,7 @@
             </a:pPr>
             <a:r>
               <a:rPr lang="en" sz="2133"/>
-              <a:t>Commands to replicate my results:</a:t>
+              <a:t>Commands to replicate results:</a:t>
             </a:r>
             <a:endParaRPr sz="2133"/>
           </a:p>
@@ -13147,7 +13283,19 @@
           <a:p>
             <a:r>
               <a:rPr lang="en"/>
-              <a:t>Live Demo: Tut 1's pthread_addsub results</a:t>
+              <a:t>Live Demo: Tut 1's </a:t>
+            </a:r>
+            <a:r>
+              <a:rPr lang="en" sz="4000">
+                <a:latin typeface="Iosevka Extended" panose="02000509030000000004" pitchFamily="49" charset="0"/>
+                <a:ea typeface="Iosevka Extended" panose="02000509030000000004" pitchFamily="49" charset="0"/>
+                <a:cs typeface="Iosevka Extended" panose="02000509030000000004" pitchFamily="49" charset="0"/>
+              </a:rPr>
+              <a:t>pthread_addsub</a:t>
+            </a:r>
+            <a:r>
+              <a:rPr lang="en"/>
+              <a:t> results</a:t>
             </a:r>
             <a:endParaRPr/>
           </a:p>
@@ -13553,7 +13701,7 @@
         </p:spPr>
         <p:txBody>
           <a:bodyPr spcFirstLastPara="1" vert="horz" wrap="square" lIns="121900" tIns="121900" rIns="121900" bIns="121900" rtlCol="0" anchor="ctr" anchorCtr="0">
-            <a:normAutofit fontScale="90000"/>
+            <a:normAutofit/>
           </a:bodyPr>
           <a:lstStyle/>
           <a:p>
@@ -14126,7 +14274,9 @@
       <p:pic>
         <p:nvPicPr>
           <p:cNvPr id="263" name="Google Shape;263;p38"/>
-          <p:cNvPicPr preferRelativeResize="0"/>
+          <p:cNvPicPr preferRelativeResize="0">
+            <a:picLocks noChangeAspect="1"/>
+          </p:cNvPicPr>
           <p:nvPr/>
         </p:nvPicPr>
         <p:blipFill rotWithShape="1">
@@ -14138,8 +14288,8 @@
         </p:blipFill>
         <p:spPr>
           <a:xfrm>
-            <a:off x="5616234" y="1536567"/>
-            <a:ext cx="6406665" cy="5080000"/>
+            <a:off x="4102066" y="3116826"/>
+            <a:ext cx="4153315" cy="3293264"/>
           </a:xfrm>
           <a:prstGeom prst="rect">
             <a:avLst/>
@@ -14892,7 +15042,7 @@
           <a:p>
             <a:r>
               <a:rPr lang="en"/>
-              <a:t>I. perf subsampling</a:t>
+              <a:t>perf subsampling</a:t>
             </a:r>
             <a:endParaRPr lang="en-SG"/>
           </a:p>
@@ -16203,12 +16353,9 @@
             </a:r>
             <a:r>
               <a:rPr lang="en-US"/>
-              <a:t>of lab </a:t>
-            </a:r>
-            <a:r>
-              <a:rPr lang="en-US" dirty="0"/>
-              <a:t>2</a:t>
-            </a:r>
+              <a:t>of lab 2</a:t>
+            </a:r>
+            <a:endParaRPr lang="en-US" dirty="0"/>
           </a:p>
         </p:txBody>
       </p:sp>
@@ -16239,19 +16386,6 @@
             <a:normAutofit/>
           </a:bodyPr>
           <a:lstStyle/>
-          <a:p>
-            <a:r>
-              <a:rPr lang="en-US" sz="2800"/>
-              <a:t>If you haven’t joined the telegram group:</a:t>
-            </a:r>
-            <a:r>
-              <a:rPr lang="en-US"/>
-              <a:t> you’re missing out</a:t>
-            </a:r>
-          </a:p>
-          <a:p>
-            <a:endParaRPr lang="en-US" sz="2800" dirty="0"/>
-          </a:p>
           <a:p>
             <a:r>
               <a:rPr lang="en-US" sz="2800"/>
@@ -17622,6 +17756,12 @@
 <file path=ppt/tags/tag1.xml><?xml version="1.0" encoding="utf-8"?>
 <p:tagLst xmlns:a="http://schemas.openxmlformats.org/drawingml/2006/main" xmlns:r="http://schemas.openxmlformats.org/officeDocument/2006/relationships" xmlns:p="http://schemas.openxmlformats.org/presentationml/2006/main">
   <p:tag name="__PE_POLL_EMBED_ID" val="38df8520-d3e8-4a20-b5a6-e9bf83b0a03e"/>
+</p:tagLst>
+</file>
+
+<file path=ppt/tags/tag2.xml><?xml version="1.0" encoding="utf-8"?>
+<p:tagLst xmlns:a="http://schemas.openxmlformats.org/drawingml/2006/main" xmlns:r="http://schemas.openxmlformats.org/officeDocument/2006/relationships" xmlns:p="http://schemas.openxmlformats.org/presentationml/2006/main">
+  <p:tag name="__PE_POLL_EMBED_ID" val="419246b1-0adf-4c36-be7a-ee199a135d9c"/>
 </p:tagLst>
 </file>
 

</xml_diff>